<commit_message>
UI-SJN-42-001L - 코딩 수정
</commit_message>
<xml_diff>
--- a/ppt/맵리스트 정리.pptx
+++ b/ppt/맵리스트 정리.pptx
@@ -263,7 +263,7 @@
           <a:p>
             <a:fld id="{D203A8F8-6A3C-431B-BFF3-386CC4580D21}" type="datetimeFigureOut">
               <a:rPr lang="ko-KR" altLang="en-US" smtClean="0"/>
-              <a:t>2022-04-17</a:t>
+              <a:t>2022-04-20</a:t>
             </a:fld>
             <a:endParaRPr lang="ko-KR" altLang="en-US"/>
           </a:p>
@@ -433,7 +433,7 @@
           <a:p>
             <a:fld id="{D203A8F8-6A3C-431B-BFF3-386CC4580D21}" type="datetimeFigureOut">
               <a:rPr lang="ko-KR" altLang="en-US" smtClean="0"/>
-              <a:t>2022-04-17</a:t>
+              <a:t>2022-04-20</a:t>
             </a:fld>
             <a:endParaRPr lang="ko-KR" altLang="en-US"/>
           </a:p>
@@ -613,7 +613,7 @@
           <a:p>
             <a:fld id="{D203A8F8-6A3C-431B-BFF3-386CC4580D21}" type="datetimeFigureOut">
               <a:rPr lang="ko-KR" altLang="en-US" smtClean="0"/>
-              <a:t>2022-04-17</a:t>
+              <a:t>2022-04-20</a:t>
             </a:fld>
             <a:endParaRPr lang="ko-KR" altLang="en-US"/>
           </a:p>
@@ -783,7 +783,7 @@
           <a:p>
             <a:fld id="{D203A8F8-6A3C-431B-BFF3-386CC4580D21}" type="datetimeFigureOut">
               <a:rPr lang="ko-KR" altLang="en-US" smtClean="0"/>
-              <a:t>2022-04-17</a:t>
+              <a:t>2022-04-20</a:t>
             </a:fld>
             <a:endParaRPr lang="ko-KR" altLang="en-US"/>
           </a:p>
@@ -1029,7 +1029,7 @@
           <a:p>
             <a:fld id="{D203A8F8-6A3C-431B-BFF3-386CC4580D21}" type="datetimeFigureOut">
               <a:rPr lang="ko-KR" altLang="en-US" smtClean="0"/>
-              <a:t>2022-04-17</a:t>
+              <a:t>2022-04-20</a:t>
             </a:fld>
             <a:endParaRPr lang="ko-KR" altLang="en-US"/>
           </a:p>
@@ -1261,7 +1261,7 @@
           <a:p>
             <a:fld id="{D203A8F8-6A3C-431B-BFF3-386CC4580D21}" type="datetimeFigureOut">
               <a:rPr lang="ko-KR" altLang="en-US" smtClean="0"/>
-              <a:t>2022-04-17</a:t>
+              <a:t>2022-04-20</a:t>
             </a:fld>
             <a:endParaRPr lang="ko-KR" altLang="en-US"/>
           </a:p>
@@ -1628,7 +1628,7 @@
           <a:p>
             <a:fld id="{D203A8F8-6A3C-431B-BFF3-386CC4580D21}" type="datetimeFigureOut">
               <a:rPr lang="ko-KR" altLang="en-US" smtClean="0"/>
-              <a:t>2022-04-17</a:t>
+              <a:t>2022-04-20</a:t>
             </a:fld>
             <a:endParaRPr lang="ko-KR" altLang="en-US"/>
           </a:p>
@@ -1746,7 +1746,7 @@
           <a:p>
             <a:fld id="{D203A8F8-6A3C-431B-BFF3-386CC4580D21}" type="datetimeFigureOut">
               <a:rPr lang="ko-KR" altLang="en-US" smtClean="0"/>
-              <a:t>2022-04-17</a:t>
+              <a:t>2022-04-20</a:t>
             </a:fld>
             <a:endParaRPr lang="ko-KR" altLang="en-US"/>
           </a:p>
@@ -1841,7 +1841,7 @@
           <a:p>
             <a:fld id="{D203A8F8-6A3C-431B-BFF3-386CC4580D21}" type="datetimeFigureOut">
               <a:rPr lang="ko-KR" altLang="en-US" smtClean="0"/>
-              <a:t>2022-04-17</a:t>
+              <a:t>2022-04-20</a:t>
             </a:fld>
             <a:endParaRPr lang="ko-KR" altLang="en-US"/>
           </a:p>
@@ -2118,7 +2118,7 @@
           <a:p>
             <a:fld id="{D203A8F8-6A3C-431B-BFF3-386CC4580D21}" type="datetimeFigureOut">
               <a:rPr lang="ko-KR" altLang="en-US" smtClean="0"/>
-              <a:t>2022-04-17</a:t>
+              <a:t>2022-04-20</a:t>
             </a:fld>
             <a:endParaRPr lang="ko-KR" altLang="en-US"/>
           </a:p>
@@ -2371,7 +2371,7 @@
           <a:p>
             <a:fld id="{D203A8F8-6A3C-431B-BFF3-386CC4580D21}" type="datetimeFigureOut">
               <a:rPr lang="ko-KR" altLang="en-US" smtClean="0"/>
-              <a:t>2022-04-17</a:t>
+              <a:t>2022-04-20</a:t>
             </a:fld>
             <a:endParaRPr lang="ko-KR" altLang="en-US"/>
           </a:p>
@@ -2584,7 +2584,7 @@
           <a:p>
             <a:fld id="{D203A8F8-6A3C-431B-BFF3-386CC4580D21}" type="datetimeFigureOut">
               <a:rPr lang="ko-KR" altLang="en-US" smtClean="0"/>
-              <a:t>2022-04-17</a:t>
+              <a:t>2022-04-20</a:t>
             </a:fld>
             <a:endParaRPr lang="ko-KR" altLang="en-US"/>
           </a:p>
@@ -5213,7 +5213,7 @@
       </p:sp>
       <p:pic>
         <p:nvPicPr>
-          <p:cNvPr id="2" name="그림 1"/>
+          <p:cNvPr id="4" name="그림 3"/>
           <p:cNvPicPr>
             <a:picLocks noChangeAspect="1"/>
           </p:cNvPicPr>
@@ -5227,8 +5227,8 @@
         </p:blipFill>
         <p:spPr>
           <a:xfrm>
-            <a:off x="506098" y="1087689"/>
-            <a:ext cx="4134427" cy="3858163"/>
+            <a:off x="3441473" y="913046"/>
+            <a:ext cx="3486637" cy="3353268"/>
           </a:xfrm>
           <a:prstGeom prst="rect">
             <a:avLst/>
@@ -5237,7 +5237,7 @@
       </p:pic>
       <p:pic>
         <p:nvPicPr>
-          <p:cNvPr id="4" name="그림 3"/>
+          <p:cNvPr id="5" name="그림 4"/>
           <p:cNvPicPr>
             <a:picLocks noChangeAspect="1"/>
           </p:cNvPicPr>
@@ -5251,108 +5251,71 @@
         </p:blipFill>
         <p:spPr>
           <a:xfrm>
-            <a:off x="5177140" y="1287671"/>
-            <a:ext cx="3486637" cy="3353268"/>
+            <a:off x="235720" y="913046"/>
+            <a:ext cx="2995618" cy="2609087"/>
           </a:xfrm>
           <a:prstGeom prst="rect">
             <a:avLst/>
           </a:prstGeom>
         </p:spPr>
       </p:pic>
-      <p:sp>
-        <p:nvSpPr>
-          <p:cNvPr id="5" name="직사각형 4"/>
-          <p:cNvSpPr/>
-          <p:nvPr/>
-        </p:nvSpPr>
-        <p:spPr>
-          <a:xfrm>
-            <a:off x="5418946" y="5006715"/>
-            <a:ext cx="2825646" cy="562131"/>
-          </a:xfrm>
-          <a:prstGeom prst="rect">
-            <a:avLst/>
-          </a:prstGeom>
-          <a:solidFill>
-            <a:srgbClr val="7030A0"/>
-          </a:solidFill>
+      <p:pic>
+        <p:nvPicPr>
+          <p:cNvPr id="6" name="그림 5"/>
+          <p:cNvPicPr>
+            <a:picLocks noChangeAspect="1"/>
+          </p:cNvPicPr>
+          <p:nvPr/>
+        </p:nvPicPr>
+        <p:blipFill>
+          <a:blip r:embed="rId4"/>
+          <a:stretch>
+            <a:fillRect/>
+          </a:stretch>
+        </p:blipFill>
+        <p:spPr>
+          <a:xfrm>
+            <a:off x="7978577" y="913046"/>
+            <a:ext cx="2838846" cy="943107"/>
+          </a:xfrm>
+          <a:prstGeom prst="rect">
+            <a:avLst/>
+          </a:prstGeom>
+        </p:spPr>
+      </p:pic>
+      <p:cxnSp>
+        <p:nvCxnSpPr>
+          <p:cNvPr id="8" name="직선 화살표 연결선 7"/>
+          <p:cNvCxnSpPr/>
+          <p:nvPr/>
+        </p:nvCxnSpPr>
+        <p:spPr>
+          <a:xfrm>
+            <a:off x="5184791" y="1049867"/>
+            <a:ext cx="2638409" cy="0"/>
+          </a:xfrm>
+          <a:prstGeom prst="straightConnector1">
+            <a:avLst/>
+          </a:prstGeom>
+          <a:ln>
+            <a:tailEnd type="triangle"/>
+          </a:ln>
         </p:spPr>
         <p:style>
-          <a:lnRef idx="2">
-            <a:schemeClr val="accent1">
-              <a:shade val="50000"/>
-            </a:schemeClr>
+          <a:lnRef idx="1">
+            <a:schemeClr val="accent1"/>
           </a:lnRef>
-          <a:fillRef idx="1">
+          <a:fillRef idx="0">
             <a:schemeClr val="accent1"/>
           </a:fillRef>
           <a:effectRef idx="0">
             <a:schemeClr val="accent1"/>
           </a:effectRef>
           <a:fontRef idx="minor">
-            <a:schemeClr val="lt1"/>
+            <a:schemeClr val="tx1"/>
           </a:fontRef>
         </p:style>
-        <p:txBody>
-          <a:bodyPr rtlCol="0" anchor="ctr"/>
-          <a:lstStyle/>
-          <a:p>
-            <a:pPr algn="ctr"/>
-            <a:r>
-              <a:rPr lang="ko-KR" altLang="en-US" dirty="0" smtClean="0"/>
-              <a:t>독자적 태그</a:t>
-            </a:r>
-            <a:endParaRPr lang="ko-KR" altLang="en-US" dirty="0"/>
-          </a:p>
-        </p:txBody>
-      </p:sp>
-      <p:sp>
-        <p:nvSpPr>
-          <p:cNvPr id="6" name="직사각형 5"/>
-          <p:cNvSpPr/>
-          <p:nvPr/>
-        </p:nvSpPr>
-        <p:spPr>
-          <a:xfrm>
-            <a:off x="5418946" y="5770685"/>
-            <a:ext cx="2825646" cy="562131"/>
-          </a:xfrm>
-          <a:prstGeom prst="rect">
-            <a:avLst/>
-          </a:prstGeom>
-          <a:solidFill>
-            <a:srgbClr val="7030A0"/>
-          </a:solidFill>
-        </p:spPr>
-        <p:style>
-          <a:lnRef idx="2">
-            <a:schemeClr val="accent1">
-              <a:shade val="50000"/>
-            </a:schemeClr>
-          </a:lnRef>
-          <a:fillRef idx="1">
-            <a:schemeClr val="accent1"/>
-          </a:fillRef>
-          <a:effectRef idx="0">
-            <a:schemeClr val="accent1"/>
-          </a:effectRef>
-          <a:fontRef idx="minor">
-            <a:schemeClr val="lt1"/>
-          </a:fontRef>
-        </p:style>
-        <p:txBody>
-          <a:bodyPr rtlCol="0" anchor="ctr"/>
-          <a:lstStyle/>
-          <a:p>
-            <a:pPr algn="ctr"/>
-            <a:r>
-              <a:rPr lang="ko-KR" altLang="en-US" dirty="0" smtClean="0"/>
-              <a:t>상세정보 버튼 없음</a:t>
-            </a:r>
-            <a:endParaRPr lang="ko-KR" altLang="en-US" dirty="0"/>
-          </a:p>
-        </p:txBody>
-      </p:sp>
+      </p:cxnSp>
     </p:spTree>
     <p:extLst>
       <p:ext uri="{BB962C8B-B14F-4D97-AF65-F5344CB8AC3E}">

</xml_diff>